<commit_message>
Moving the inspection port to the DAI entity
</commit_message>
<xml_diff>
--- a/designs/containers/vnf-deployment/diagrams/vnf-deployment-tasks.pptx
+++ b/designs/containers/vnf-deployment/diagrams/vnf-deployment-tasks.pptx
@@ -104,6 +104,11 @@
       </a:defRPr>
     </a:lvl9pPr>
   </p:defaultTextStyle>
+  <p:extLst>
+    <p:ext uri="{EFAFB233-063F-42B5-8137-9DF3F51BA10A}">
+      <p15:sldGuideLst xmlns:p15="http://schemas.microsoft.com/office/powerpoint/2012/main"/>
+    </p:ext>
+  </p:extLst>
 </p:presentation>
 </file>
 
@@ -238,7 +243,7 @@
           <a:p>
             <a:fld id="{751B88A9-2822-4128-BC0E-DAF46248B12C}" type="datetimeFigureOut">
               <a:rPr lang="en-US" smtClean="0"/>
-              <a:t>8/24/2017</a:t>
+              <a:t>8/25/2017</a:t>
             </a:fld>
             <a:endParaRPr lang="en-US"/>
           </a:p>
@@ -408,7 +413,7 @@
           <a:p>
             <a:fld id="{751B88A9-2822-4128-BC0E-DAF46248B12C}" type="datetimeFigureOut">
               <a:rPr lang="en-US" smtClean="0"/>
-              <a:t>8/24/2017</a:t>
+              <a:t>8/25/2017</a:t>
             </a:fld>
             <a:endParaRPr lang="en-US"/>
           </a:p>
@@ -588,7 +593,7 @@
           <a:p>
             <a:fld id="{751B88A9-2822-4128-BC0E-DAF46248B12C}" type="datetimeFigureOut">
               <a:rPr lang="en-US" smtClean="0"/>
-              <a:t>8/24/2017</a:t>
+              <a:t>8/25/2017</a:t>
             </a:fld>
             <a:endParaRPr lang="en-US"/>
           </a:p>
@@ -758,7 +763,7 @@
           <a:p>
             <a:fld id="{751B88A9-2822-4128-BC0E-DAF46248B12C}" type="datetimeFigureOut">
               <a:rPr lang="en-US" smtClean="0"/>
-              <a:t>8/24/2017</a:t>
+              <a:t>8/25/2017</a:t>
             </a:fld>
             <a:endParaRPr lang="en-US"/>
           </a:p>
@@ -1004,7 +1009,7 @@
           <a:p>
             <a:fld id="{751B88A9-2822-4128-BC0E-DAF46248B12C}" type="datetimeFigureOut">
               <a:rPr lang="en-US" smtClean="0"/>
-              <a:t>8/24/2017</a:t>
+              <a:t>8/25/2017</a:t>
             </a:fld>
             <a:endParaRPr lang="en-US"/>
           </a:p>
@@ -1236,7 +1241,7 @@
           <a:p>
             <a:fld id="{751B88A9-2822-4128-BC0E-DAF46248B12C}" type="datetimeFigureOut">
               <a:rPr lang="en-US" smtClean="0"/>
-              <a:t>8/24/2017</a:t>
+              <a:t>8/25/2017</a:t>
             </a:fld>
             <a:endParaRPr lang="en-US"/>
           </a:p>
@@ -1603,7 +1608,7 @@
           <a:p>
             <a:fld id="{751B88A9-2822-4128-BC0E-DAF46248B12C}" type="datetimeFigureOut">
               <a:rPr lang="en-US" smtClean="0"/>
-              <a:t>8/24/2017</a:t>
+              <a:t>8/25/2017</a:t>
             </a:fld>
             <a:endParaRPr lang="en-US"/>
           </a:p>
@@ -1721,7 +1726,7 @@
           <a:p>
             <a:fld id="{751B88A9-2822-4128-BC0E-DAF46248B12C}" type="datetimeFigureOut">
               <a:rPr lang="en-US" smtClean="0"/>
-              <a:t>8/24/2017</a:t>
+              <a:t>8/25/2017</a:t>
             </a:fld>
             <a:endParaRPr lang="en-US"/>
           </a:p>
@@ -1816,7 +1821,7 @@
           <a:p>
             <a:fld id="{751B88A9-2822-4128-BC0E-DAF46248B12C}" type="datetimeFigureOut">
               <a:rPr lang="en-US" smtClean="0"/>
-              <a:t>8/24/2017</a:t>
+              <a:t>8/25/2017</a:t>
             </a:fld>
             <a:endParaRPr lang="en-US"/>
           </a:p>
@@ -2093,7 +2098,7 @@
           <a:p>
             <a:fld id="{751B88A9-2822-4128-BC0E-DAF46248B12C}" type="datetimeFigureOut">
               <a:rPr lang="en-US" smtClean="0"/>
-              <a:t>8/24/2017</a:t>
+              <a:t>8/25/2017</a:t>
             </a:fld>
             <a:endParaRPr lang="en-US"/>
           </a:p>
@@ -2346,7 +2351,7 @@
           <a:p>
             <a:fld id="{751B88A9-2822-4128-BC0E-DAF46248B12C}" type="datetimeFigureOut">
               <a:rPr lang="en-US" smtClean="0"/>
-              <a:t>8/24/2017</a:t>
+              <a:t>8/25/2017</a:t>
             </a:fld>
             <a:endParaRPr lang="en-US"/>
           </a:p>
@@ -2559,7 +2564,7 @@
           <a:p>
             <a:fld id="{751B88A9-2822-4128-BC0E-DAF46248B12C}" type="datetimeFigureOut">
               <a:rPr lang="en-US" smtClean="0"/>
-              <a:t>8/24/2017</a:t>
+              <a:t>8/25/2017</a:t>
             </a:fld>
             <a:endParaRPr lang="en-US"/>
           </a:p>
@@ -2966,14 +2971,14 @@
       </p:grpSpPr>
       <p:sp>
         <p:nvSpPr>
-          <p:cNvPr id="307" name="Rectangle 306"/>
+          <p:cNvPr id="67" name="Rectangle 66"/>
           <p:cNvSpPr/>
           <p:nvPr/>
         </p:nvSpPr>
         <p:spPr>
           <a:xfrm>
-            <a:off x="2074430" y="5929940"/>
-            <a:ext cx="3407649" cy="600159"/>
+            <a:off x="3902342" y="4462159"/>
+            <a:ext cx="3364660" cy="724454"/>
           </a:xfrm>
           <a:prstGeom prst="rect">
             <a:avLst/>
@@ -3023,6 +3028,63 @@
       </p:sp>
       <p:sp>
         <p:nvSpPr>
+          <p:cNvPr id="307" name="Rectangle 306"/>
+          <p:cNvSpPr/>
+          <p:nvPr/>
+        </p:nvSpPr>
+        <p:spPr>
+          <a:xfrm>
+            <a:off x="2074430" y="5929940"/>
+            <a:ext cx="3407649" cy="600159"/>
+          </a:xfrm>
+          <a:prstGeom prst="rect">
+            <a:avLst/>
+          </a:prstGeom>
+          <a:solidFill>
+            <a:schemeClr val="accent1">
+              <a:lumMod val="20000"/>
+              <a:lumOff val="80000"/>
+            </a:schemeClr>
+          </a:solidFill>
+        </p:spPr>
+        <p:style>
+          <a:lnRef idx="2">
+            <a:schemeClr val="accent1">
+              <a:shade val="50000"/>
+            </a:schemeClr>
+          </a:lnRef>
+          <a:fillRef idx="1">
+            <a:schemeClr val="accent1"/>
+          </a:fillRef>
+          <a:effectRef idx="0">
+            <a:schemeClr val="accent1"/>
+          </a:effectRef>
+          <a:fontRef idx="minor">
+            <a:schemeClr val="lt1"/>
+          </a:fontRef>
+        </p:style>
+        <p:txBody>
+          <a:bodyPr rtlCol="0" anchor="t"/>
+          <a:lstStyle/>
+          <a:p>
+            <a:r>
+              <a:rPr lang="en-US" sz="800" dirty="0" smtClean="0">
+                <a:solidFill>
+                  <a:schemeClr val="tx1"/>
+                </a:solidFill>
+              </a:rPr>
+              <a:t>Concurrent/Parallel Tasks</a:t>
+            </a:r>
+            <a:endParaRPr lang="en-US" sz="800" dirty="0">
+              <a:solidFill>
+                <a:schemeClr val="tx1"/>
+              </a:solidFill>
+            </a:endParaRPr>
+          </a:p>
+        </p:txBody>
+      </p:sp>
+      <p:sp>
+        <p:nvSpPr>
           <p:cNvPr id="228" name="Rectangle 227"/>
           <p:cNvSpPr/>
           <p:nvPr/>
@@ -3030,7 +3092,7 @@
         <p:spPr>
           <a:xfrm>
             <a:off x="411565" y="4438544"/>
-            <a:ext cx="6733380" cy="724454"/>
+            <a:ext cx="3364660" cy="724454"/>
           </a:xfrm>
           <a:prstGeom prst="rect">
             <a:avLst/>
@@ -3239,15 +3301,7 @@
                   <a:schemeClr val="tx1"/>
                 </a:solidFill>
               </a:rPr>
-              <a:t>Is </a:t>
-            </a:r>
-            <a:r>
-              <a:rPr lang="en-US" sz="1000" dirty="0" smtClean="0">
-                <a:solidFill>
-                  <a:schemeClr val="tx1"/>
-                </a:solidFill>
-              </a:rPr>
-              <a:t>DS/VS/DA marked for deletion?</a:t>
+              <a:t>Is DS/VS/DA marked for deletion?</a:t>
             </a:r>
             <a:endParaRPr lang="en-US" sz="1000" dirty="0">
               <a:solidFill>
@@ -5000,7 +5054,7 @@
             <a:pPr algn="ctr"/>
             <a:r>
               <a:rPr lang="en-US" sz="1000" dirty="0" smtClean="0"/>
-              <a:t>CreateK8sDAITask</a:t>
+              <a:t>CreateOrUpdateK8sDAITask</a:t>
             </a:r>
             <a:endParaRPr lang="en-US" sz="1000" dirty="0"/>
           </a:p>
@@ -5014,7 +5068,7 @@
         </p:nvSpPr>
         <p:spPr>
           <a:xfrm>
-            <a:off x="549863" y="4800771"/>
+            <a:off x="549863" y="4776057"/>
             <a:ext cx="3090219" cy="286868"/>
           </a:xfrm>
           <a:prstGeom prst="rect">
@@ -5027,7 +5081,9 @@
           </a:solidFill>
           <a:ln w="57150">
             <a:solidFill>
-              <a:schemeClr val="accent2"/>
+              <a:schemeClr val="bg1">
+                <a:lumMod val="65000"/>
+              </a:schemeClr>
             </a:solidFill>
           </a:ln>
         </p:spPr>
@@ -5053,8 +5109,8 @@
           <a:p>
             <a:pPr algn="ctr"/>
             <a:r>
-              <a:rPr lang="en-US" sz="1000" dirty="0" err="1"/>
-              <a:t>DeleteDAIFromDbTask</a:t>
+              <a:rPr lang="en-US" sz="1000" dirty="0"/>
+              <a:t>DeleteOrCleanK8sDAITask</a:t>
             </a:r>
             <a:endParaRPr lang="en-US" sz="1000" dirty="0"/>
           </a:p>
@@ -5187,44 +5243,8 @@
         </p:nvCxnSpPr>
         <p:spPr>
           <a:xfrm rot="5400000">
-            <a:off x="2048996" y="4361826"/>
-            <a:ext cx="484923" cy="392967"/>
-          </a:xfrm>
-          <a:prstGeom prst="bentConnector3">
-            <a:avLst/>
-          </a:prstGeom>
-          <a:ln>
-            <a:tailEnd type="triangle"/>
-          </a:ln>
-        </p:spPr>
-        <p:style>
-          <a:lnRef idx="1">
-            <a:schemeClr val="accent1"/>
-          </a:lnRef>
-          <a:fillRef idx="0">
-            <a:schemeClr val="accent1"/>
-          </a:fillRef>
-          <a:effectRef idx="0">
-            <a:schemeClr val="accent1"/>
-          </a:effectRef>
-          <a:fontRef idx="minor">
-            <a:schemeClr val="tx1"/>
-          </a:fontRef>
-        </p:style>
-      </p:cxnSp>
-      <p:cxnSp>
-        <p:nvCxnSpPr>
-          <p:cNvPr id="246" name="Elbow Connector 245"/>
-          <p:cNvCxnSpPr>
-            <a:stCxn id="242" idx="2"/>
-            <a:endCxn id="226" idx="0"/>
-          </p:cNvCxnSpPr>
-          <p:nvPr/>
-        </p:nvCxnSpPr>
-        <p:spPr>
-          <a:xfrm rot="16200000" flipH="1">
-            <a:off x="4861150" y="4128259"/>
-            <a:ext cx="457637" cy="801846"/>
+            <a:off x="2061353" y="4349469"/>
+            <a:ext cx="460209" cy="392967"/>
           </a:xfrm>
           <a:prstGeom prst="bentConnector3">
             <a:avLst/>
@@ -5610,7 +5630,31 @@
                   <a:schemeClr val="tx1"/>
                 </a:solidFill>
               </a:rPr>
-              <a:t>For each orphan inspection port</a:t>
+              <a:t>For </a:t>
+            </a:r>
+            <a:r>
+              <a:rPr lang="en-US" sz="1000" dirty="0" smtClean="0">
+                <a:solidFill>
+                  <a:schemeClr val="tx1"/>
+                </a:solidFill>
+              </a:rPr>
+              <a:t>each DAI with changed </a:t>
+            </a:r>
+            <a:r>
+              <a:rPr lang="en-US" sz="1000" dirty="0" err="1" smtClean="0">
+                <a:solidFill>
+                  <a:schemeClr val="tx1"/>
+                </a:solidFill>
+              </a:rPr>
+              <a:t>vport</a:t>
+            </a:r>
+            <a:r>
+              <a:rPr lang="en-US" sz="1000" dirty="0" smtClean="0">
+                <a:solidFill>
+                  <a:schemeClr val="tx1"/>
+                </a:solidFill>
+              </a:rPr>
+              <a:t>:</a:t>
             </a:r>
             <a:endParaRPr lang="en-US" sz="1000" dirty="0">
               <a:solidFill>
@@ -5718,6 +5762,78 @@
           <a:ln>
             <a:prstDash val="lgDash"/>
             <a:tailEnd type="triangle"/>
+          </a:ln>
+        </p:spPr>
+        <p:style>
+          <a:lnRef idx="1">
+            <a:schemeClr val="accent1"/>
+          </a:lnRef>
+          <a:fillRef idx="0">
+            <a:schemeClr val="accent1"/>
+          </a:fillRef>
+          <a:effectRef idx="0">
+            <a:schemeClr val="accent1"/>
+          </a:effectRef>
+          <a:fontRef idx="minor">
+            <a:schemeClr val="tx1"/>
+          </a:fontRef>
+        </p:style>
+      </p:cxnSp>
+      <p:cxnSp>
+        <p:nvCxnSpPr>
+          <p:cNvPr id="3" name="Elbow Connector 2"/>
+          <p:cNvCxnSpPr>
+            <a:stCxn id="227" idx="3"/>
+            <a:endCxn id="226" idx="1"/>
+          </p:cNvCxnSpPr>
+          <p:nvPr/>
+        </p:nvCxnSpPr>
+        <p:spPr>
+          <a:xfrm>
+            <a:off x="3640082" y="4919491"/>
+            <a:ext cx="361872" cy="3232"/>
+          </a:xfrm>
+          <a:prstGeom prst="bentConnector3">
+            <a:avLst/>
+          </a:prstGeom>
+          <a:ln>
+            <a:tailEnd type="triangle"/>
+          </a:ln>
+        </p:spPr>
+        <p:style>
+          <a:lnRef idx="1">
+            <a:schemeClr val="accent1"/>
+          </a:lnRef>
+          <a:fillRef idx="0">
+            <a:schemeClr val="accent1"/>
+          </a:fillRef>
+          <a:effectRef idx="0">
+            <a:schemeClr val="accent1"/>
+          </a:effectRef>
+          <a:fontRef idx="minor">
+            <a:schemeClr val="tx1"/>
+          </a:fontRef>
+        </p:style>
+      </p:cxnSp>
+      <p:cxnSp>
+        <p:nvCxnSpPr>
+          <p:cNvPr id="68" name="Curved Connector 67"/>
+          <p:cNvCxnSpPr>
+            <a:stCxn id="242" idx="3"/>
+            <a:endCxn id="67" idx="0"/>
+          </p:cNvCxnSpPr>
+          <p:nvPr/>
+        </p:nvCxnSpPr>
+        <p:spPr>
+          <a:xfrm>
+            <a:off x="5363585" y="4125413"/>
+            <a:ext cx="221087" cy="336746"/>
+          </a:xfrm>
+          <a:prstGeom prst="curvedConnector2">
+            <a:avLst/>
+          </a:prstGeom>
+          <a:ln>
+            <a:prstDash val="dash"/>
           </a:ln>
         </p:spPr>
         <p:style>

</xml_diff>